<commit_message>
save rpz and presentation
</commit_message>
<xml_diff>
--- a/РПЗ/презентация_Кондрашова.pptx
+++ b/РПЗ/презентация_Кондрашова.pptx
@@ -19,8 +19,8 @@
     <p:sldId id="297" r:id="rId10"/>
     <p:sldId id="285" r:id="rId11"/>
     <p:sldId id="296" r:id="rId12"/>
-    <p:sldId id="293" r:id="rId13"/>
-    <p:sldId id="294" r:id="rId14"/>
+    <p:sldId id="294" r:id="rId13"/>
+    <p:sldId id="293" r:id="rId14"/>
     <p:sldId id="282" r:id="rId15"/>
     <p:sldId id="289" r:id="rId16"/>
     <p:sldId id="290" r:id="rId17"/>
@@ -227,7 +227,7 @@
             <a:fld id="{B24C1625-D5FD-4961-8EAB-1FA61EEA71E7}" type="datetimeFigureOut">
               <a:rPr lang="ru-RU" smtClean="0"/>
               <a:pPr/>
-              <a:t>05.06.2021</a:t>
+              <a:t>06.06.2021</a:t>
             </a:fld>
             <a:endParaRPr lang="ru-RU"/>
           </a:p>
@@ -752,7 +752,7 @@
             <a:fld id="{6289C4F5-5BFF-4154-922C-ABB746440172}" type="slidenum">
               <a:rPr lang="ru-RU" smtClean="0"/>
               <a:pPr/>
-              <a:t>13</a:t>
+              <a:t>12</a:t>
             </a:fld>
             <a:endParaRPr lang="ru-RU"/>
           </a:p>
@@ -919,7 +919,7 @@
             <a:fld id="{703E3709-A417-4BA4-9DB9-C03B4C8BAA4E}" type="datetime1">
               <a:rPr lang="ru-RU" smtClean="0"/>
               <a:pPr/>
-              <a:t>05.06.2021</a:t>
+              <a:t>06.06.2021</a:t>
             </a:fld>
             <a:endParaRPr lang="ru-RU"/>
           </a:p>
@@ -1119,7 +1119,7 @@
             <a:fld id="{E84E5E01-CA5B-494A-9C4C-0A4511EEFE60}" type="datetime1">
               <a:rPr lang="ru-RU" smtClean="0"/>
               <a:pPr/>
-              <a:t>05.06.2021</a:t>
+              <a:t>06.06.2021</a:t>
             </a:fld>
             <a:endParaRPr lang="ru-RU"/>
           </a:p>
@@ -1329,7 +1329,7 @@
             <a:fld id="{EC69EC0E-4C6D-4D35-9720-ED568FE3BC26}" type="datetime1">
               <a:rPr lang="ru-RU" smtClean="0"/>
               <a:pPr/>
-              <a:t>05.06.2021</a:t>
+              <a:t>06.06.2021</a:t>
             </a:fld>
             <a:endParaRPr lang="ru-RU"/>
           </a:p>
@@ -1529,7 +1529,7 @@
             <a:fld id="{BA3139B0-C124-44CF-B8D5-1CDD431F5F1F}" type="datetime1">
               <a:rPr lang="ru-RU" smtClean="0"/>
               <a:pPr/>
-              <a:t>05.06.2021</a:t>
+              <a:t>06.06.2021</a:t>
             </a:fld>
             <a:endParaRPr lang="ru-RU"/>
           </a:p>
@@ -1806,7 +1806,7 @@
             <a:fld id="{1D59D3DA-E4B9-44AC-A369-0B4DC908419D}" type="datetime1">
               <a:rPr lang="ru-RU" smtClean="0"/>
               <a:pPr/>
-              <a:t>05.06.2021</a:t>
+              <a:t>06.06.2021</a:t>
             </a:fld>
             <a:endParaRPr lang="ru-RU"/>
           </a:p>
@@ -2073,7 +2073,7 @@
             <a:fld id="{50A031DE-CB04-4870-9C75-1465DCB69FDB}" type="datetime1">
               <a:rPr lang="ru-RU" smtClean="0"/>
               <a:pPr/>
-              <a:t>05.06.2021</a:t>
+              <a:t>06.06.2021</a:t>
             </a:fld>
             <a:endParaRPr lang="ru-RU"/>
           </a:p>
@@ -2487,7 +2487,7 @@
             <a:fld id="{4FEFF6B4-3589-4899-AAF7-4B76B13265E9}" type="datetime1">
               <a:rPr lang="ru-RU" smtClean="0"/>
               <a:pPr/>
-              <a:t>05.06.2021</a:t>
+              <a:t>06.06.2021</a:t>
             </a:fld>
             <a:endParaRPr lang="ru-RU"/>
           </a:p>
@@ -2630,7 +2630,7 @@
             <a:fld id="{D891499A-FB2B-4995-8E9F-E0E46C8EE9B4}" type="datetime1">
               <a:rPr lang="ru-RU" smtClean="0"/>
               <a:pPr/>
-              <a:t>05.06.2021</a:t>
+              <a:t>06.06.2021</a:t>
             </a:fld>
             <a:endParaRPr lang="ru-RU"/>
           </a:p>
@@ -2745,7 +2745,7 @@
             <a:fld id="{A8980C0B-7E8C-4609-A955-3F89959A46DA}" type="datetime1">
               <a:rPr lang="ru-RU" smtClean="0"/>
               <a:pPr/>
-              <a:t>05.06.2021</a:t>
+              <a:t>06.06.2021</a:t>
             </a:fld>
             <a:endParaRPr lang="ru-RU"/>
           </a:p>
@@ -3058,7 +3058,7 @@
             <a:fld id="{BE84B986-6865-4485-BDE5-D57B9DC994D2}" type="datetime1">
               <a:rPr lang="ru-RU" smtClean="0"/>
               <a:pPr/>
-              <a:t>05.06.2021</a:t>
+              <a:t>06.06.2021</a:t>
             </a:fld>
             <a:endParaRPr lang="ru-RU"/>
           </a:p>
@@ -3348,7 +3348,7 @@
             <a:fld id="{16CB19F2-C561-4971-B3DE-FECD1D4FDC6E}" type="datetime1">
               <a:rPr lang="ru-RU" smtClean="0"/>
               <a:pPr/>
-              <a:t>05.06.2021</a:t>
+              <a:t>06.06.2021</a:t>
             </a:fld>
             <a:endParaRPr lang="ru-RU"/>
           </a:p>
@@ -3591,7 +3591,7 @@
             <a:fld id="{2F1403D6-804E-451C-A4C8-E9FBB80237BA}" type="datetime1">
               <a:rPr lang="ru-RU" smtClean="0"/>
               <a:pPr/>
-              <a:t>05.06.2021</a:t>
+              <a:t>06.06.2021</a:t>
             </a:fld>
             <a:endParaRPr lang="ru-RU"/>
           </a:p>
@@ -4649,870 +4649,6 @@
                 <a:latin typeface="Times New Roman" panose="02020603050405020304" pitchFamily="18" charset="0"/>
                 <a:cs typeface="Times New Roman" panose="02020603050405020304" pitchFamily="18" charset="0"/>
               </a:rPr>
-              <a:t>Используемые метрики качества</a:t>
-            </a:r>
-          </a:p>
-        </p:txBody>
-      </p:sp>
-      <p:sp>
-        <p:nvSpPr>
-          <p:cNvPr id="3" name="Объект 2">
-            <a:extLst>
-              <a:ext uri="{FF2B5EF4-FFF2-40B4-BE49-F238E27FC236}">
-                <a16:creationId xmlns:a16="http://schemas.microsoft.com/office/drawing/2014/main" id="{2CA1D980-884A-AD4A-A267-4009569FB9A9}"/>
-              </a:ext>
-            </a:extLst>
-          </p:cNvPr>
-          <p:cNvSpPr>
-            <a:spLocks noGrp="1"/>
-          </p:cNvSpPr>
-          <p:nvPr>
-            <p:ph idx="1"/>
-          </p:nvPr>
-        </p:nvSpPr>
-        <p:spPr>
-          <a:xfrm>
-            <a:off x="838200" y="1562582"/>
-            <a:ext cx="10515600" cy="1576858"/>
-          </a:xfrm>
-        </p:spPr>
-        <p:txBody>
-          <a:bodyPr>
-            <a:normAutofit fontScale="25000" lnSpcReduction="20000"/>
-          </a:bodyPr>
-          <a:lstStyle/>
-          <a:p>
-            <a:pPr>
-              <a:lnSpc>
-                <a:spcPct val="100000"/>
-              </a:lnSpc>
-            </a:pPr>
-            <a:r>
-              <a:rPr lang="ru-RU" sz="9600" b="1" dirty="0">
-                <a:latin typeface="Times New Roman" panose="02020603050405020304" pitchFamily="18" charset="0"/>
-                <a:cs typeface="Times New Roman" panose="02020603050405020304" pitchFamily="18" charset="0"/>
-              </a:rPr>
-              <a:t>Точность </a:t>
-            </a:r>
-            <a:r>
-              <a:rPr lang="en-US" sz="9600" b="1" dirty="0">
-                <a:latin typeface="Times New Roman" panose="02020603050405020304" pitchFamily="18" charset="0"/>
-                <a:cs typeface="Times New Roman" panose="02020603050405020304" pitchFamily="18" charset="0"/>
-              </a:rPr>
-              <a:t>(accuracy)</a:t>
-            </a:r>
-            <a:r>
-              <a:rPr lang="ru-RU" sz="9600" b="1" dirty="0">
-                <a:latin typeface="Times New Roman" panose="02020603050405020304" pitchFamily="18" charset="0"/>
-                <a:cs typeface="Times New Roman" panose="02020603050405020304" pitchFamily="18" charset="0"/>
-              </a:rPr>
-              <a:t> </a:t>
-            </a:r>
-            <a:r>
-              <a:rPr lang="ru-RU" sz="9600" dirty="0">
-                <a:latin typeface="Times New Roman" panose="02020603050405020304" pitchFamily="18" charset="0"/>
-                <a:cs typeface="Times New Roman" panose="02020603050405020304" pitchFamily="18" charset="0"/>
-              </a:rPr>
-              <a:t>– доля правильно предсказанных классификатором классов среди всех предсказанных значений. </a:t>
-            </a:r>
-            <a:br>
-              <a:rPr lang="ru-RU" sz="9600" dirty="0">
-                <a:latin typeface="Times New Roman" panose="02020603050405020304" pitchFamily="18" charset="0"/>
-                <a:cs typeface="Times New Roman" panose="02020603050405020304" pitchFamily="18" charset="0"/>
-              </a:rPr>
-            </a:br>
-            <a:endParaRPr lang="ru-RU" sz="9600" dirty="0">
-              <a:latin typeface="Times New Roman" panose="02020603050405020304" pitchFamily="18" charset="0"/>
-              <a:cs typeface="Times New Roman" panose="02020603050405020304" pitchFamily="18" charset="0"/>
-            </a:endParaRPr>
-          </a:p>
-          <a:p>
-            <a:pPr>
-              <a:lnSpc>
-                <a:spcPct val="100000"/>
-              </a:lnSpc>
-            </a:pPr>
-            <a:r>
-              <a:rPr lang="en-US" sz="9600" b="1" dirty="0">
-                <a:latin typeface="Times New Roman" panose="02020603050405020304" pitchFamily="18" charset="0"/>
-                <a:cs typeface="Times New Roman" panose="02020603050405020304" pitchFamily="18" charset="0"/>
-              </a:rPr>
-              <a:t>F-</a:t>
-            </a:r>
-            <a:r>
-              <a:rPr lang="ru-RU" sz="9600" b="1" dirty="0">
-                <a:latin typeface="Times New Roman" panose="02020603050405020304" pitchFamily="18" charset="0"/>
-                <a:cs typeface="Times New Roman" panose="02020603050405020304" pitchFamily="18" charset="0"/>
-              </a:rPr>
-              <a:t>мера</a:t>
-            </a:r>
-            <a:br>
-              <a:rPr lang="ru-RU" sz="7400" dirty="0">
-                <a:latin typeface="Times New Roman" panose="02020603050405020304" pitchFamily="18" charset="0"/>
-                <a:cs typeface="Times New Roman" panose="02020603050405020304" pitchFamily="18" charset="0"/>
-              </a:rPr>
-            </a:br>
-            <a:br>
-              <a:rPr lang="ru-RU" sz="7400" dirty="0">
-                <a:latin typeface="Times New Roman" panose="02020603050405020304" pitchFamily="18" charset="0"/>
-                <a:cs typeface="Times New Roman" panose="02020603050405020304" pitchFamily="18" charset="0"/>
-              </a:rPr>
-            </a:br>
-            <a:endParaRPr lang="ru-RU" sz="7400" dirty="0">
-              <a:latin typeface="Times New Roman" panose="02020603050405020304" pitchFamily="18" charset="0"/>
-              <a:cs typeface="Times New Roman" panose="02020603050405020304" pitchFamily="18" charset="0"/>
-            </a:endParaRPr>
-          </a:p>
-          <a:p>
-            <a:pPr marL="0" indent="0">
-              <a:lnSpc>
-                <a:spcPct val="100000"/>
-              </a:lnSpc>
-              <a:buNone/>
-            </a:pPr>
-            <a:endParaRPr lang="ru-RU" dirty="0">
-              <a:latin typeface="Times New Roman" panose="02020603050405020304" pitchFamily="18" charset="0"/>
-              <a:cs typeface="Times New Roman" panose="02020603050405020304" pitchFamily="18" charset="0"/>
-            </a:endParaRPr>
-          </a:p>
-          <a:p>
-            <a:pPr marL="0" indent="0">
-              <a:lnSpc>
-                <a:spcPct val="100000"/>
-              </a:lnSpc>
-              <a:buNone/>
-            </a:pPr>
-            <a:br>
-              <a:rPr lang="ru-RU" dirty="0">
-                <a:latin typeface="Times New Roman" panose="02020603050405020304" pitchFamily="18" charset="0"/>
-                <a:cs typeface="Times New Roman" panose="02020603050405020304" pitchFamily="18" charset="0"/>
-              </a:rPr>
-            </a:br>
-            <a:endParaRPr lang="ru-RU" dirty="0">
-              <a:latin typeface="Times New Roman" panose="02020603050405020304" pitchFamily="18" charset="0"/>
-              <a:cs typeface="Times New Roman" panose="02020603050405020304" pitchFamily="18" charset="0"/>
-            </a:endParaRPr>
-          </a:p>
-          <a:p>
-            <a:pPr marL="0" indent="0">
-              <a:lnSpc>
-                <a:spcPct val="100000"/>
-              </a:lnSpc>
-              <a:buNone/>
-            </a:pPr>
-            <a:br>
-              <a:rPr lang="ru-RU" sz="2800" dirty="0">
-                <a:latin typeface="Times New Roman" panose="02020603050405020304" pitchFamily="18" charset="0"/>
-                <a:cs typeface="Times New Roman" panose="02020603050405020304" pitchFamily="18" charset="0"/>
-              </a:rPr>
-            </a:br>
-            <a:endParaRPr lang="ru-RU" sz="2800" dirty="0">
-              <a:latin typeface="Times New Roman" panose="02020603050405020304" pitchFamily="18" charset="0"/>
-              <a:cs typeface="Times New Roman" panose="02020603050405020304" pitchFamily="18" charset="0"/>
-            </a:endParaRPr>
-          </a:p>
-        </p:txBody>
-      </p:sp>
-      <p:sp>
-        <p:nvSpPr>
-          <p:cNvPr id="5" name="Номер слайда 4">
-            <a:extLst>
-              <a:ext uri="{FF2B5EF4-FFF2-40B4-BE49-F238E27FC236}">
-                <a16:creationId xmlns:a16="http://schemas.microsoft.com/office/drawing/2014/main" id="{9F3495B7-380D-924A-86A4-09BFB46C044B}"/>
-              </a:ext>
-            </a:extLst>
-          </p:cNvPr>
-          <p:cNvSpPr>
-            <a:spLocks noGrp="1"/>
-          </p:cNvSpPr>
-          <p:nvPr>
-            <p:ph type="sldNum" sz="quarter" idx="12"/>
-          </p:nvPr>
-        </p:nvSpPr>
-        <p:spPr>
-          <a:xfrm>
-            <a:off x="5151120" y="4612805"/>
-            <a:ext cx="2743200" cy="365125"/>
-          </a:xfrm>
-        </p:spPr>
-        <p:txBody>
-          <a:bodyPr/>
-          <a:lstStyle/>
-          <a:p>
-            <a:fld id="{6BB697E3-DD58-B344-99E6-BC7A3ED9A2AD}" type="slidenum">
-              <a:rPr lang="ru-RU" smtClean="0"/>
-              <a:t>12</a:t>
-            </a:fld>
-            <a:endParaRPr lang="ru-RU"/>
-          </a:p>
-        </p:txBody>
-      </p:sp>
-      <p:pic>
-        <p:nvPicPr>
-          <p:cNvPr id="6" name="Рисунок 5">
-            <a:extLst>
-              <a:ext uri="{FF2B5EF4-FFF2-40B4-BE49-F238E27FC236}">
-                <a16:creationId xmlns:a16="http://schemas.microsoft.com/office/drawing/2014/main" id="{80D91F3A-5E5C-0B4A-BE7E-6C3D1FEEF654}"/>
-              </a:ext>
-            </a:extLst>
-          </p:cNvPr>
-          <p:cNvPicPr>
-            <a:picLocks noChangeAspect="1"/>
-          </p:cNvPicPr>
-          <p:nvPr/>
-        </p:nvPicPr>
-        <p:blipFill>
-          <a:blip r:embed="rId2">
-            <a:extLst>
-              <a:ext uri="{28A0092B-C50C-407E-A947-70E740481C1C}">
-                <a14:useLocalDpi xmlns:a14="http://schemas.microsoft.com/office/drawing/2010/main" val="0"/>
-              </a:ext>
-            </a:extLst>
-          </a:blip>
-          <a:stretch>
-            <a:fillRect/>
-          </a:stretch>
-        </p:blipFill>
-        <p:spPr>
-          <a:xfrm>
-            <a:off x="838200" y="3139440"/>
-            <a:ext cx="7327900" cy="1422400"/>
-          </a:xfrm>
-          <a:prstGeom prst="rect">
-            <a:avLst/>
-          </a:prstGeom>
-        </p:spPr>
-      </p:pic>
-      <mc:AlternateContent xmlns:mc="http://schemas.openxmlformats.org/markup-compatibility/2006" xmlns:a14="http://schemas.microsoft.com/office/drawing/2010/main">
-        <mc:Choice Requires="a14">
-          <p:sp>
-            <p:nvSpPr>
-              <p:cNvPr id="7" name="TextBox 6">
-                <a:extLst>
-                  <a:ext uri="{FF2B5EF4-FFF2-40B4-BE49-F238E27FC236}">
-                    <a16:creationId xmlns:a16="http://schemas.microsoft.com/office/drawing/2014/main" id="{72645B95-4DEE-DA43-B4A8-52696ABCD5DC}"/>
-                  </a:ext>
-                </a:extLst>
-              </p:cNvPr>
-              <p:cNvSpPr txBox="1"/>
-              <p:nvPr/>
-            </p:nvSpPr>
-            <p:spPr>
-              <a:xfrm>
-                <a:off x="685800" y="5033035"/>
-                <a:ext cx="3017520" cy="673711"/>
-              </a:xfrm>
-              <a:prstGeom prst="rect">
-                <a:avLst/>
-              </a:prstGeom>
-              <a:noFill/>
-            </p:spPr>
-            <p:txBody>
-              <a:bodyPr wrap="square" rtlCol="0">
-                <a:spAutoFit/>
-              </a:bodyPr>
-              <a:lstStyle/>
-              <a:p>
-                <a:pPr/>
-                <a14:m>
-                  <m:oMathPara xmlns:m="http://schemas.openxmlformats.org/officeDocument/2006/math">
-                    <m:oMathParaPr>
-                      <m:jc m:val="centerGroup"/>
-                    </m:oMathParaPr>
-                    <m:oMath xmlns:m="http://schemas.openxmlformats.org/officeDocument/2006/math">
-                      <m:r>
-                        <a:rPr lang="ru-RU" sz="2000" i="1">
-                          <a:latin typeface="Cambria Math" panose="02040503050406030204" pitchFamily="18" charset="0"/>
-                        </a:rPr>
-                        <m:t>𝑃𝑟𝑒𝑐𝑖𝑠𝑖𝑜𝑛</m:t>
-                      </m:r>
-                      <m:r>
-                        <a:rPr lang="ru-RU" sz="2000" i="1">
-                          <a:latin typeface="Cambria Math" panose="02040503050406030204" pitchFamily="18" charset="0"/>
-                        </a:rPr>
-                        <m:t>=</m:t>
-                      </m:r>
-                      <m:f>
-                        <m:fPr>
-                          <m:ctrlPr>
-                            <a:rPr lang="ru-RU" sz="2000" i="1">
-                              <a:latin typeface="Cambria Math" panose="02040503050406030204" pitchFamily="18" charset="0"/>
-                            </a:rPr>
-                          </m:ctrlPr>
-                        </m:fPr>
-                        <m:num>
-                          <m:r>
-                            <a:rPr lang="ru-RU" sz="2000" i="1">
-                              <a:latin typeface="Cambria Math" panose="02040503050406030204" pitchFamily="18" charset="0"/>
-                            </a:rPr>
-                            <m:t>𝑇𝑃</m:t>
-                          </m:r>
-                        </m:num>
-                        <m:den>
-                          <m:r>
-                            <a:rPr lang="ru-RU" sz="2000" i="1">
-                              <a:latin typeface="Cambria Math" panose="02040503050406030204" pitchFamily="18" charset="0"/>
-                            </a:rPr>
-                            <m:t>𝑇𝑃</m:t>
-                          </m:r>
-                          <m:r>
-                            <a:rPr lang="ru-RU" sz="2000" i="1">
-                              <a:latin typeface="Cambria Math" panose="02040503050406030204" pitchFamily="18" charset="0"/>
-                            </a:rPr>
-                            <m:t>+</m:t>
-                          </m:r>
-                          <m:r>
-                            <a:rPr lang="ru-RU" sz="2000" i="1">
-                              <a:latin typeface="Cambria Math" panose="02040503050406030204" pitchFamily="18" charset="0"/>
-                            </a:rPr>
-                            <m:t>𝐹𝑃</m:t>
-                          </m:r>
-                        </m:den>
-                      </m:f>
-                    </m:oMath>
-                  </m:oMathPara>
-                </a14:m>
-                <a:endParaRPr lang="ru-RU" sz="2000" dirty="0"/>
-              </a:p>
-            </p:txBody>
-          </p:sp>
-        </mc:Choice>
-        <mc:Fallback xmlns="">
-          <p:sp>
-            <p:nvSpPr>
-              <p:cNvPr id="7" name="TextBox 6">
-                <a:extLst>
-                  <a:ext uri="{FF2B5EF4-FFF2-40B4-BE49-F238E27FC236}">
-                    <a16:creationId xmlns:a16="http://schemas.microsoft.com/office/drawing/2014/main" id="{72645B95-4DEE-DA43-B4A8-52696ABCD5DC}"/>
-                  </a:ext>
-                </a:extLst>
-              </p:cNvPr>
-              <p:cNvSpPr txBox="1">
-                <a:spLocks noRot="1" noChangeAspect="1" noMove="1" noResize="1" noEditPoints="1" noAdjustHandles="1" noChangeArrowheads="1" noChangeShapeType="1" noTextEdit="1"/>
-              </p:cNvSpPr>
-              <p:nvPr/>
-            </p:nvSpPr>
-            <p:spPr>
-              <a:xfrm>
-                <a:off x="685800" y="5033035"/>
-                <a:ext cx="3017520" cy="673711"/>
-              </a:xfrm>
-              <a:prstGeom prst="rect">
-                <a:avLst/>
-              </a:prstGeom>
-              <a:blipFill>
-                <a:blip r:embed="rId3"/>
-                <a:stretch>
-                  <a:fillRect b="-3774"/>
-                </a:stretch>
-              </a:blipFill>
-            </p:spPr>
-            <p:txBody>
-              <a:bodyPr/>
-              <a:lstStyle/>
-              <a:p>
-                <a:r>
-                  <a:rPr lang="ru-RU">
-                    <a:noFill/>
-                  </a:rPr>
-                  <a:t> </a:t>
-                </a:r>
-              </a:p>
-            </p:txBody>
-          </p:sp>
-        </mc:Fallback>
-      </mc:AlternateContent>
-      <mc:AlternateContent xmlns:mc="http://schemas.openxmlformats.org/markup-compatibility/2006" xmlns:a14="http://schemas.microsoft.com/office/drawing/2010/main">
-        <mc:Choice Requires="a14">
-          <p:sp>
-            <p:nvSpPr>
-              <p:cNvPr id="8" name="TextBox 7">
-                <a:extLst>
-                  <a:ext uri="{FF2B5EF4-FFF2-40B4-BE49-F238E27FC236}">
-                    <a16:creationId xmlns:a16="http://schemas.microsoft.com/office/drawing/2014/main" id="{635ADA2D-F59B-A640-927D-DDDCF1FE98FA}"/>
-                  </a:ext>
-                </a:extLst>
-              </p:cNvPr>
-              <p:cNvSpPr txBox="1"/>
-              <p:nvPr/>
-            </p:nvSpPr>
-            <p:spPr>
-              <a:xfrm>
-                <a:off x="3916680" y="5038585"/>
-                <a:ext cx="2468880" cy="673711"/>
-              </a:xfrm>
-              <a:prstGeom prst="rect">
-                <a:avLst/>
-              </a:prstGeom>
-              <a:noFill/>
-            </p:spPr>
-            <p:txBody>
-              <a:bodyPr wrap="square" rtlCol="0">
-                <a:spAutoFit/>
-              </a:bodyPr>
-              <a:lstStyle/>
-              <a:p>
-                <a:pPr/>
-                <a14:m>
-                  <m:oMathPara xmlns:m="http://schemas.openxmlformats.org/officeDocument/2006/math">
-                    <m:oMathParaPr>
-                      <m:jc m:val="centerGroup"/>
-                    </m:oMathParaPr>
-                    <m:oMath xmlns:m="http://schemas.openxmlformats.org/officeDocument/2006/math">
-                      <m:r>
-                        <a:rPr lang="ru-RU" sz="2000" i="1">
-                          <a:latin typeface="Cambria Math" panose="02040503050406030204" pitchFamily="18" charset="0"/>
-                        </a:rPr>
-                        <m:t>𝑅𝑒𝑐𝑎𝑙𝑙</m:t>
-                      </m:r>
-                      <m:r>
-                        <a:rPr lang="ru-RU" sz="2000" i="1">
-                          <a:latin typeface="Cambria Math" panose="02040503050406030204" pitchFamily="18" charset="0"/>
-                        </a:rPr>
-                        <m:t>=</m:t>
-                      </m:r>
-                      <m:f>
-                        <m:fPr>
-                          <m:ctrlPr>
-                            <a:rPr lang="ru-RU" sz="2000" i="1">
-                              <a:latin typeface="Cambria Math" panose="02040503050406030204" pitchFamily="18" charset="0"/>
-                            </a:rPr>
-                          </m:ctrlPr>
-                        </m:fPr>
-                        <m:num>
-                          <m:r>
-                            <a:rPr lang="ru-RU" sz="2000" i="1">
-                              <a:latin typeface="Cambria Math" panose="02040503050406030204" pitchFamily="18" charset="0"/>
-                            </a:rPr>
-                            <m:t>𝑇𝑃</m:t>
-                          </m:r>
-                        </m:num>
-                        <m:den>
-                          <m:r>
-                            <a:rPr lang="ru-RU" sz="2000" i="1">
-                              <a:latin typeface="Cambria Math" panose="02040503050406030204" pitchFamily="18" charset="0"/>
-                            </a:rPr>
-                            <m:t>𝑇𝑃</m:t>
-                          </m:r>
-                          <m:r>
-                            <a:rPr lang="ru-RU" sz="2000" i="1">
-                              <a:latin typeface="Cambria Math" panose="02040503050406030204" pitchFamily="18" charset="0"/>
-                            </a:rPr>
-                            <m:t>+</m:t>
-                          </m:r>
-                          <m:r>
-                            <a:rPr lang="ru-RU" sz="2000" i="1">
-                              <a:latin typeface="Cambria Math" panose="02040503050406030204" pitchFamily="18" charset="0"/>
-                            </a:rPr>
-                            <m:t>𝐹𝑁</m:t>
-                          </m:r>
-                        </m:den>
-                      </m:f>
-                    </m:oMath>
-                  </m:oMathPara>
-                </a14:m>
-                <a:endParaRPr lang="ru-RU" sz="2000" dirty="0"/>
-              </a:p>
-            </p:txBody>
-          </p:sp>
-        </mc:Choice>
-        <mc:Fallback xmlns="">
-          <p:sp>
-            <p:nvSpPr>
-              <p:cNvPr id="8" name="TextBox 7">
-                <a:extLst>
-                  <a:ext uri="{FF2B5EF4-FFF2-40B4-BE49-F238E27FC236}">
-                    <a16:creationId xmlns:a16="http://schemas.microsoft.com/office/drawing/2014/main" id="{635ADA2D-F59B-A640-927D-DDDCF1FE98FA}"/>
-                  </a:ext>
-                </a:extLst>
-              </p:cNvPr>
-              <p:cNvSpPr txBox="1">
-                <a:spLocks noRot="1" noChangeAspect="1" noMove="1" noResize="1" noEditPoints="1" noAdjustHandles="1" noChangeArrowheads="1" noChangeShapeType="1" noTextEdit="1"/>
-              </p:cNvSpPr>
-              <p:nvPr/>
-            </p:nvSpPr>
-            <p:spPr>
-              <a:xfrm>
-                <a:off x="3916680" y="5038585"/>
-                <a:ext cx="2468880" cy="673711"/>
-              </a:xfrm>
-              <a:prstGeom prst="rect">
-                <a:avLst/>
-              </a:prstGeom>
-              <a:blipFill>
-                <a:blip r:embed="rId4"/>
-                <a:stretch>
-                  <a:fillRect b="-3704"/>
-                </a:stretch>
-              </a:blipFill>
-            </p:spPr>
-            <p:txBody>
-              <a:bodyPr/>
-              <a:lstStyle/>
-              <a:p>
-                <a:r>
-                  <a:rPr lang="ru-RU">
-                    <a:noFill/>
-                  </a:rPr>
-                  <a:t> </a:t>
-                </a:r>
-              </a:p>
-            </p:txBody>
-          </p:sp>
-        </mc:Fallback>
-      </mc:AlternateContent>
-      <mc:AlternateContent xmlns:mc="http://schemas.openxmlformats.org/markup-compatibility/2006" xmlns:a14="http://schemas.microsoft.com/office/drawing/2010/main">
-        <mc:Choice Requires="a14">
-          <p:sp>
-            <p:nvSpPr>
-              <p:cNvPr id="9" name="TextBox 8">
-                <a:extLst>
-                  <a:ext uri="{FF2B5EF4-FFF2-40B4-BE49-F238E27FC236}">
-                    <a16:creationId xmlns:a16="http://schemas.microsoft.com/office/drawing/2014/main" id="{C168057A-606C-4F40-A513-D04D0D8BF483}"/>
-                  </a:ext>
-                </a:extLst>
-              </p:cNvPr>
-              <p:cNvSpPr txBox="1"/>
-              <p:nvPr/>
-            </p:nvSpPr>
-            <p:spPr>
-              <a:xfrm>
-                <a:off x="7223760" y="5038585"/>
-                <a:ext cx="3916680" cy="681853"/>
-              </a:xfrm>
-              <a:prstGeom prst="rect">
-                <a:avLst/>
-              </a:prstGeom>
-              <a:noFill/>
-            </p:spPr>
-            <p:txBody>
-              <a:bodyPr wrap="square" rtlCol="0">
-                <a:spAutoFit/>
-              </a:bodyPr>
-              <a:lstStyle/>
-              <a:p>
-                <a:pPr/>
-                <a14:m>
-                  <m:oMathPara xmlns:m="http://schemas.openxmlformats.org/officeDocument/2006/math">
-                    <m:oMathParaPr>
-                      <m:jc m:val="centerGroup"/>
-                    </m:oMathParaPr>
-                    <m:oMath xmlns:m="http://schemas.openxmlformats.org/officeDocument/2006/math">
-                      <m:r>
-                        <a:rPr lang="ru-RU" sz="2000" i="1">
-                          <a:latin typeface="Cambria Math" panose="02040503050406030204" pitchFamily="18" charset="0"/>
-                        </a:rPr>
-                        <m:t>𝐹</m:t>
-                      </m:r>
-                      <m:r>
-                        <a:rPr lang="ru-RU" sz="2000" i="1">
-                          <a:latin typeface="Cambria Math" panose="02040503050406030204" pitchFamily="18" charset="0"/>
-                        </a:rPr>
-                        <m:t>=2</m:t>
-                      </m:r>
-                      <m:f>
-                        <m:fPr>
-                          <m:ctrlPr>
-                            <a:rPr lang="ru-RU" sz="2000" i="1">
-                              <a:latin typeface="Cambria Math" panose="02040503050406030204" pitchFamily="18" charset="0"/>
-                            </a:rPr>
-                          </m:ctrlPr>
-                        </m:fPr>
-                        <m:num>
-                          <m:r>
-                            <a:rPr lang="ru-RU" sz="2000" i="1">
-                              <a:latin typeface="Cambria Math" panose="02040503050406030204" pitchFamily="18" charset="0"/>
-                            </a:rPr>
-                            <m:t>𝑃𝑟𝑒𝑐𝑖𝑠𝑖𝑜𝑛</m:t>
-                          </m:r>
-                          <m:r>
-                            <a:rPr lang="ru-RU" sz="2000" i="1">
-                              <a:latin typeface="Cambria Math" panose="02040503050406030204" pitchFamily="18" charset="0"/>
-                            </a:rPr>
-                            <m:t>×</m:t>
-                          </m:r>
-                          <m:r>
-                            <a:rPr lang="ru-RU" sz="2000" i="1">
-                              <a:latin typeface="Cambria Math" panose="02040503050406030204" pitchFamily="18" charset="0"/>
-                            </a:rPr>
-                            <m:t>𝑅𝑒𝑐𝑎𝑙𝑙</m:t>
-                          </m:r>
-                        </m:num>
-                        <m:den>
-                          <m:r>
-                            <a:rPr lang="ru-RU" sz="2000" i="1">
-                              <a:latin typeface="Cambria Math" panose="02040503050406030204" pitchFamily="18" charset="0"/>
-                            </a:rPr>
-                            <m:t>𝑃𝑟𝑒𝑐𝑖𝑠𝑖𝑜𝑛</m:t>
-                          </m:r>
-                          <m:r>
-                            <a:rPr lang="ru-RU" sz="2000" i="1">
-                              <a:latin typeface="Cambria Math" panose="02040503050406030204" pitchFamily="18" charset="0"/>
-                            </a:rPr>
-                            <m:t>+</m:t>
-                          </m:r>
-                          <m:r>
-                            <a:rPr lang="ru-RU" sz="2000" i="1">
-                              <a:latin typeface="Cambria Math" panose="02040503050406030204" pitchFamily="18" charset="0"/>
-                            </a:rPr>
-                            <m:t>𝑅𝑒𝑐𝑎𝑙𝑙</m:t>
-                          </m:r>
-                        </m:den>
-                      </m:f>
-                    </m:oMath>
-                  </m:oMathPara>
-                </a14:m>
-                <a:endParaRPr lang="ru-RU" sz="2000" dirty="0"/>
-              </a:p>
-            </p:txBody>
-          </p:sp>
-        </mc:Choice>
-        <mc:Fallback xmlns="">
-          <p:sp>
-            <p:nvSpPr>
-              <p:cNvPr id="9" name="TextBox 8">
-                <a:extLst>
-                  <a:ext uri="{FF2B5EF4-FFF2-40B4-BE49-F238E27FC236}">
-                    <a16:creationId xmlns:a16="http://schemas.microsoft.com/office/drawing/2014/main" id="{C168057A-606C-4F40-A513-D04D0D8BF483}"/>
-                  </a:ext>
-                </a:extLst>
-              </p:cNvPr>
-              <p:cNvSpPr txBox="1">
-                <a:spLocks noRot="1" noChangeAspect="1" noMove="1" noResize="1" noEditPoints="1" noAdjustHandles="1" noChangeArrowheads="1" noChangeShapeType="1" noTextEdit="1"/>
-              </p:cNvSpPr>
-              <p:nvPr/>
-            </p:nvSpPr>
-            <p:spPr>
-              <a:xfrm>
-                <a:off x="7223760" y="5038585"/>
-                <a:ext cx="3916680" cy="681853"/>
-              </a:xfrm>
-              <a:prstGeom prst="rect">
-                <a:avLst/>
-              </a:prstGeom>
-              <a:blipFill>
-                <a:blip r:embed="rId5"/>
-                <a:stretch>
-                  <a:fillRect b="-5556"/>
-                </a:stretch>
-              </a:blipFill>
-            </p:spPr>
-            <p:txBody>
-              <a:bodyPr/>
-              <a:lstStyle/>
-              <a:p>
-                <a:r>
-                  <a:rPr lang="ru-RU">
-                    <a:noFill/>
-                  </a:rPr>
-                  <a:t> </a:t>
-                </a:r>
-              </a:p>
-            </p:txBody>
-          </p:sp>
-        </mc:Fallback>
-      </mc:AlternateContent>
-      <p:sp>
-        <p:nvSpPr>
-          <p:cNvPr id="10" name="Номер слайда 3">
-            <a:extLst>
-              <a:ext uri="{FF2B5EF4-FFF2-40B4-BE49-F238E27FC236}">
-                <a16:creationId xmlns:a16="http://schemas.microsoft.com/office/drawing/2014/main" id="{6A4DE3E8-8B63-0046-94E9-6EFEF8C751A9}"/>
-              </a:ext>
-            </a:extLst>
-          </p:cNvPr>
-          <p:cNvSpPr txBox="1">
-            <a:spLocks/>
-          </p:cNvSpPr>
-          <p:nvPr/>
-        </p:nvSpPr>
-        <p:spPr>
-          <a:xfrm>
-            <a:off x="8610600" y="6356350"/>
-            <a:ext cx="2743200" cy="365125"/>
-          </a:xfrm>
-          <a:prstGeom prst="rect">
-            <a:avLst/>
-          </a:prstGeom>
-        </p:spPr>
-        <p:txBody>
-          <a:bodyPr vert="horz" lIns="91440" tIns="45720" rIns="91440" bIns="45720" rtlCol="0" anchor="ctr"/>
-          <a:lstStyle>
-            <a:defPPr>
-              <a:defRPr lang="ru-RU"/>
-            </a:defPPr>
-            <a:lvl1pPr marL="0" algn="r" defTabSz="914400" rtl="0" eaLnBrk="1" latinLnBrk="0" hangingPunct="1">
-              <a:defRPr sz="1200" kern="1200">
-                <a:solidFill>
-                  <a:schemeClr val="tx1">
-                    <a:tint val="75000"/>
-                  </a:schemeClr>
-                </a:solidFill>
-                <a:latin typeface="+mn-lt"/>
-                <a:ea typeface="+mn-ea"/>
-                <a:cs typeface="+mn-cs"/>
-              </a:defRPr>
-            </a:lvl1pPr>
-            <a:lvl2pPr marL="457200" algn="l" defTabSz="914400" rtl="0" eaLnBrk="1" latinLnBrk="0" hangingPunct="1">
-              <a:defRPr sz="1800" kern="1200">
-                <a:solidFill>
-                  <a:schemeClr val="tx1"/>
-                </a:solidFill>
-                <a:latin typeface="+mn-lt"/>
-                <a:ea typeface="+mn-ea"/>
-                <a:cs typeface="+mn-cs"/>
-              </a:defRPr>
-            </a:lvl2pPr>
-            <a:lvl3pPr marL="914400" algn="l" defTabSz="914400" rtl="0" eaLnBrk="1" latinLnBrk="0" hangingPunct="1">
-              <a:defRPr sz="1800" kern="1200">
-                <a:solidFill>
-                  <a:schemeClr val="tx1"/>
-                </a:solidFill>
-                <a:latin typeface="+mn-lt"/>
-                <a:ea typeface="+mn-ea"/>
-                <a:cs typeface="+mn-cs"/>
-              </a:defRPr>
-            </a:lvl3pPr>
-            <a:lvl4pPr marL="1371600" algn="l" defTabSz="914400" rtl="0" eaLnBrk="1" latinLnBrk="0" hangingPunct="1">
-              <a:defRPr sz="1800" kern="1200">
-                <a:solidFill>
-                  <a:schemeClr val="tx1"/>
-                </a:solidFill>
-                <a:latin typeface="+mn-lt"/>
-                <a:ea typeface="+mn-ea"/>
-                <a:cs typeface="+mn-cs"/>
-              </a:defRPr>
-            </a:lvl4pPr>
-            <a:lvl5pPr marL="1828800" algn="l" defTabSz="914400" rtl="0" eaLnBrk="1" latinLnBrk="0" hangingPunct="1">
-              <a:defRPr sz="1800" kern="1200">
-                <a:solidFill>
-                  <a:schemeClr val="tx1"/>
-                </a:solidFill>
-                <a:latin typeface="+mn-lt"/>
-                <a:ea typeface="+mn-ea"/>
-                <a:cs typeface="+mn-cs"/>
-              </a:defRPr>
-            </a:lvl5pPr>
-            <a:lvl6pPr marL="2286000" algn="l" defTabSz="914400" rtl="0" eaLnBrk="1" latinLnBrk="0" hangingPunct="1">
-              <a:defRPr sz="1800" kern="1200">
-                <a:solidFill>
-                  <a:schemeClr val="tx1"/>
-                </a:solidFill>
-                <a:latin typeface="+mn-lt"/>
-                <a:ea typeface="+mn-ea"/>
-                <a:cs typeface="+mn-cs"/>
-              </a:defRPr>
-            </a:lvl6pPr>
-            <a:lvl7pPr marL="2743200" algn="l" defTabSz="914400" rtl="0" eaLnBrk="1" latinLnBrk="0" hangingPunct="1">
-              <a:defRPr sz="1800" kern="1200">
-                <a:solidFill>
-                  <a:schemeClr val="tx1"/>
-                </a:solidFill>
-                <a:latin typeface="+mn-lt"/>
-                <a:ea typeface="+mn-ea"/>
-                <a:cs typeface="+mn-cs"/>
-              </a:defRPr>
-            </a:lvl7pPr>
-            <a:lvl8pPr marL="3200400" algn="l" defTabSz="914400" rtl="0" eaLnBrk="1" latinLnBrk="0" hangingPunct="1">
-              <a:defRPr sz="1800" kern="1200">
-                <a:solidFill>
-                  <a:schemeClr val="tx1"/>
-                </a:solidFill>
-                <a:latin typeface="+mn-lt"/>
-                <a:ea typeface="+mn-ea"/>
-                <a:cs typeface="+mn-cs"/>
-              </a:defRPr>
-            </a:lvl8pPr>
-            <a:lvl9pPr marL="3657600" algn="l" defTabSz="914400" rtl="0" eaLnBrk="1" latinLnBrk="0" hangingPunct="1">
-              <a:defRPr sz="1800" kern="1200">
-                <a:solidFill>
-                  <a:schemeClr val="tx1"/>
-                </a:solidFill>
-                <a:latin typeface="+mn-lt"/>
-                <a:ea typeface="+mn-ea"/>
-                <a:cs typeface="+mn-cs"/>
-              </a:defRPr>
-            </a:lvl9pPr>
-          </a:lstStyle>
-          <a:p>
-            <a:fld id="{8B784E8A-7D10-4AAF-929C-959B71E0249E}" type="slidenum">
-              <a:rPr lang="ru-RU" sz="2400" smtClean="0">
-                <a:solidFill>
-                  <a:schemeClr val="tx1"/>
-                </a:solidFill>
-                <a:latin typeface="Times New Roman" pitchFamily="18" charset="0"/>
-                <a:cs typeface="Times New Roman" pitchFamily="18" charset="0"/>
-              </a:rPr>
-              <a:pPr/>
-              <a:t>12</a:t>
-            </a:fld>
-            <a:endParaRPr lang="ru-RU" sz="2400" dirty="0">
-              <a:solidFill>
-                <a:schemeClr val="tx1"/>
-              </a:solidFill>
-              <a:latin typeface="Times New Roman" pitchFamily="18" charset="0"/>
-              <a:cs typeface="Times New Roman" pitchFamily="18" charset="0"/>
-            </a:endParaRPr>
-          </a:p>
-        </p:txBody>
-      </p:sp>
-    </p:spTree>
-    <p:extLst>
-      <p:ext uri="{BB962C8B-B14F-4D97-AF65-F5344CB8AC3E}">
-        <p14:creationId xmlns:p14="http://schemas.microsoft.com/office/powerpoint/2010/main" val="3507773334"/>
-      </p:ext>
-    </p:extLst>
-  </p:cSld>
-  <p:clrMapOvr>
-    <a:masterClrMapping/>
-  </p:clrMapOvr>
-</p:sld>
-</file>
-
-<file path=ppt/slides/slide13.xml><?xml version="1.0" encoding="utf-8"?>
-<p:sld xmlns:a="http://schemas.openxmlformats.org/drawingml/2006/main" xmlns:r="http://schemas.openxmlformats.org/officeDocument/2006/relationships" xmlns:p="http://schemas.openxmlformats.org/presentationml/2006/main">
-  <p:cSld>
-    <p:spTree>
-      <p:nvGrpSpPr>
-        <p:cNvPr id="1" name=""/>
-        <p:cNvGrpSpPr/>
-        <p:nvPr/>
-      </p:nvGrpSpPr>
-      <p:grpSpPr>
-        <a:xfrm>
-          <a:off x="0" y="0"/>
-          <a:ext cx="0" cy="0"/>
-          <a:chOff x="0" y="0"/>
-          <a:chExt cx="0" cy="0"/>
-        </a:xfrm>
-      </p:grpSpPr>
-      <p:sp>
-        <p:nvSpPr>
-          <p:cNvPr id="2" name="Заголовок 1">
-            <a:extLst>
-              <a:ext uri="{FF2B5EF4-FFF2-40B4-BE49-F238E27FC236}">
-                <a16:creationId xmlns:a16="http://schemas.microsoft.com/office/drawing/2014/main" id="{68C510DA-43C2-BC42-9310-310510C61E15}"/>
-              </a:ext>
-            </a:extLst>
-          </p:cNvPr>
-          <p:cNvSpPr>
-            <a:spLocks noGrp="1"/>
-          </p:cNvSpPr>
-          <p:nvPr>
-            <p:ph type="title"/>
-          </p:nvPr>
-        </p:nvSpPr>
-        <p:spPr/>
-        <p:txBody>
-          <a:bodyPr/>
-          <a:lstStyle/>
-          <a:p>
-            <a:pPr algn="ctr"/>
-            <a:r>
-              <a:rPr lang="ru-RU" dirty="0">
-                <a:latin typeface="Times New Roman" panose="02020603050405020304" pitchFamily="18" charset="0"/>
-                <a:cs typeface="Times New Roman" panose="02020603050405020304" pitchFamily="18" charset="0"/>
-              </a:rPr>
               <a:t>Обучающая выборка</a:t>
             </a:r>
           </a:p>
@@ -5827,7 +4963,7 @@
                 <a:latin typeface="Times New Roman" panose="02020603050405020304" pitchFamily="18" charset="0"/>
                 <a:cs typeface="Times New Roman" panose="02020603050405020304" pitchFamily="18" charset="0"/>
               </a:rPr>
-              <a:t>13</a:t>
+              <a:t>12</a:t>
             </a:fld>
             <a:endParaRPr lang="ru-RU" sz="2400" dirty="0">
               <a:solidFill>
@@ -6509,6 +5645,870 @@
 </p:sld>
 </file>
 
+<file path=ppt/slides/slide13.xml><?xml version="1.0" encoding="utf-8"?>
+<p:sld xmlns:a="http://schemas.openxmlformats.org/drawingml/2006/main" xmlns:r="http://schemas.openxmlformats.org/officeDocument/2006/relationships" xmlns:p="http://schemas.openxmlformats.org/presentationml/2006/main">
+  <p:cSld>
+    <p:spTree>
+      <p:nvGrpSpPr>
+        <p:cNvPr id="1" name=""/>
+        <p:cNvGrpSpPr/>
+        <p:nvPr/>
+      </p:nvGrpSpPr>
+      <p:grpSpPr>
+        <a:xfrm>
+          <a:off x="0" y="0"/>
+          <a:ext cx="0" cy="0"/>
+          <a:chOff x="0" y="0"/>
+          <a:chExt cx="0" cy="0"/>
+        </a:xfrm>
+      </p:grpSpPr>
+      <p:sp>
+        <p:nvSpPr>
+          <p:cNvPr id="2" name="Заголовок 1">
+            <a:extLst>
+              <a:ext uri="{FF2B5EF4-FFF2-40B4-BE49-F238E27FC236}">
+                <a16:creationId xmlns:a16="http://schemas.microsoft.com/office/drawing/2014/main" id="{68C510DA-43C2-BC42-9310-310510C61E15}"/>
+              </a:ext>
+            </a:extLst>
+          </p:cNvPr>
+          <p:cNvSpPr>
+            <a:spLocks noGrp="1"/>
+          </p:cNvSpPr>
+          <p:nvPr>
+            <p:ph type="title"/>
+          </p:nvPr>
+        </p:nvSpPr>
+        <p:spPr/>
+        <p:txBody>
+          <a:bodyPr/>
+          <a:lstStyle/>
+          <a:p>
+            <a:pPr algn="ctr"/>
+            <a:r>
+              <a:rPr lang="ru-RU" dirty="0">
+                <a:latin typeface="Times New Roman" panose="02020603050405020304" pitchFamily="18" charset="0"/>
+                <a:cs typeface="Times New Roman" panose="02020603050405020304" pitchFamily="18" charset="0"/>
+              </a:rPr>
+              <a:t>Используемые метрики качества</a:t>
+            </a:r>
+          </a:p>
+        </p:txBody>
+      </p:sp>
+      <p:sp>
+        <p:nvSpPr>
+          <p:cNvPr id="3" name="Объект 2">
+            <a:extLst>
+              <a:ext uri="{FF2B5EF4-FFF2-40B4-BE49-F238E27FC236}">
+                <a16:creationId xmlns:a16="http://schemas.microsoft.com/office/drawing/2014/main" id="{2CA1D980-884A-AD4A-A267-4009569FB9A9}"/>
+              </a:ext>
+            </a:extLst>
+          </p:cNvPr>
+          <p:cNvSpPr>
+            <a:spLocks noGrp="1"/>
+          </p:cNvSpPr>
+          <p:nvPr>
+            <p:ph idx="1"/>
+          </p:nvPr>
+        </p:nvSpPr>
+        <p:spPr>
+          <a:xfrm>
+            <a:off x="838200" y="1562582"/>
+            <a:ext cx="10515600" cy="1576858"/>
+          </a:xfrm>
+        </p:spPr>
+        <p:txBody>
+          <a:bodyPr>
+            <a:normAutofit fontScale="25000" lnSpcReduction="20000"/>
+          </a:bodyPr>
+          <a:lstStyle/>
+          <a:p>
+            <a:pPr>
+              <a:lnSpc>
+                <a:spcPct val="100000"/>
+              </a:lnSpc>
+            </a:pPr>
+            <a:r>
+              <a:rPr lang="ru-RU" sz="9600" b="1" dirty="0">
+                <a:latin typeface="Times New Roman" panose="02020603050405020304" pitchFamily="18" charset="0"/>
+                <a:cs typeface="Times New Roman" panose="02020603050405020304" pitchFamily="18" charset="0"/>
+              </a:rPr>
+              <a:t>Точность </a:t>
+            </a:r>
+            <a:r>
+              <a:rPr lang="en-US" sz="9600" b="1" dirty="0">
+                <a:latin typeface="Times New Roman" panose="02020603050405020304" pitchFamily="18" charset="0"/>
+                <a:cs typeface="Times New Roman" panose="02020603050405020304" pitchFamily="18" charset="0"/>
+              </a:rPr>
+              <a:t>(accuracy)</a:t>
+            </a:r>
+            <a:r>
+              <a:rPr lang="ru-RU" sz="9600" b="1" dirty="0">
+                <a:latin typeface="Times New Roman" panose="02020603050405020304" pitchFamily="18" charset="0"/>
+                <a:cs typeface="Times New Roman" panose="02020603050405020304" pitchFamily="18" charset="0"/>
+              </a:rPr>
+              <a:t> </a:t>
+            </a:r>
+            <a:r>
+              <a:rPr lang="ru-RU" sz="9600" dirty="0">
+                <a:latin typeface="Times New Roman" panose="02020603050405020304" pitchFamily="18" charset="0"/>
+                <a:cs typeface="Times New Roman" panose="02020603050405020304" pitchFamily="18" charset="0"/>
+              </a:rPr>
+              <a:t>– доля правильно предсказанных классификатором классов среди всех предсказанных значений. </a:t>
+            </a:r>
+            <a:br>
+              <a:rPr lang="ru-RU" sz="9600" dirty="0">
+                <a:latin typeface="Times New Roman" panose="02020603050405020304" pitchFamily="18" charset="0"/>
+                <a:cs typeface="Times New Roman" panose="02020603050405020304" pitchFamily="18" charset="0"/>
+              </a:rPr>
+            </a:br>
+            <a:endParaRPr lang="ru-RU" sz="9600" dirty="0">
+              <a:latin typeface="Times New Roman" panose="02020603050405020304" pitchFamily="18" charset="0"/>
+              <a:cs typeface="Times New Roman" panose="02020603050405020304" pitchFamily="18" charset="0"/>
+            </a:endParaRPr>
+          </a:p>
+          <a:p>
+            <a:pPr>
+              <a:lnSpc>
+                <a:spcPct val="100000"/>
+              </a:lnSpc>
+            </a:pPr>
+            <a:r>
+              <a:rPr lang="en-US" sz="9600" b="1" dirty="0">
+                <a:latin typeface="Times New Roman" panose="02020603050405020304" pitchFamily="18" charset="0"/>
+                <a:cs typeface="Times New Roman" panose="02020603050405020304" pitchFamily="18" charset="0"/>
+              </a:rPr>
+              <a:t>F-</a:t>
+            </a:r>
+            <a:r>
+              <a:rPr lang="ru-RU" sz="9600" b="1" dirty="0">
+                <a:latin typeface="Times New Roman" panose="02020603050405020304" pitchFamily="18" charset="0"/>
+                <a:cs typeface="Times New Roman" panose="02020603050405020304" pitchFamily="18" charset="0"/>
+              </a:rPr>
+              <a:t>мера</a:t>
+            </a:r>
+            <a:br>
+              <a:rPr lang="ru-RU" sz="7400" dirty="0">
+                <a:latin typeface="Times New Roman" panose="02020603050405020304" pitchFamily="18" charset="0"/>
+                <a:cs typeface="Times New Roman" panose="02020603050405020304" pitchFamily="18" charset="0"/>
+              </a:rPr>
+            </a:br>
+            <a:br>
+              <a:rPr lang="ru-RU" sz="7400" dirty="0">
+                <a:latin typeface="Times New Roman" panose="02020603050405020304" pitchFamily="18" charset="0"/>
+                <a:cs typeface="Times New Roman" panose="02020603050405020304" pitchFamily="18" charset="0"/>
+              </a:rPr>
+            </a:br>
+            <a:endParaRPr lang="ru-RU" sz="7400" dirty="0">
+              <a:latin typeface="Times New Roman" panose="02020603050405020304" pitchFamily="18" charset="0"/>
+              <a:cs typeface="Times New Roman" panose="02020603050405020304" pitchFamily="18" charset="0"/>
+            </a:endParaRPr>
+          </a:p>
+          <a:p>
+            <a:pPr marL="0" indent="0">
+              <a:lnSpc>
+                <a:spcPct val="100000"/>
+              </a:lnSpc>
+              <a:buNone/>
+            </a:pPr>
+            <a:endParaRPr lang="ru-RU" dirty="0">
+              <a:latin typeface="Times New Roman" panose="02020603050405020304" pitchFamily="18" charset="0"/>
+              <a:cs typeface="Times New Roman" panose="02020603050405020304" pitchFamily="18" charset="0"/>
+            </a:endParaRPr>
+          </a:p>
+          <a:p>
+            <a:pPr marL="0" indent="0">
+              <a:lnSpc>
+                <a:spcPct val="100000"/>
+              </a:lnSpc>
+              <a:buNone/>
+            </a:pPr>
+            <a:br>
+              <a:rPr lang="ru-RU" dirty="0">
+                <a:latin typeface="Times New Roman" panose="02020603050405020304" pitchFamily="18" charset="0"/>
+                <a:cs typeface="Times New Roman" panose="02020603050405020304" pitchFamily="18" charset="0"/>
+              </a:rPr>
+            </a:br>
+            <a:endParaRPr lang="ru-RU" dirty="0">
+              <a:latin typeface="Times New Roman" panose="02020603050405020304" pitchFamily="18" charset="0"/>
+              <a:cs typeface="Times New Roman" panose="02020603050405020304" pitchFamily="18" charset="0"/>
+            </a:endParaRPr>
+          </a:p>
+          <a:p>
+            <a:pPr marL="0" indent="0">
+              <a:lnSpc>
+                <a:spcPct val="100000"/>
+              </a:lnSpc>
+              <a:buNone/>
+            </a:pPr>
+            <a:br>
+              <a:rPr lang="ru-RU" sz="2800" dirty="0">
+                <a:latin typeface="Times New Roman" panose="02020603050405020304" pitchFamily="18" charset="0"/>
+                <a:cs typeface="Times New Roman" panose="02020603050405020304" pitchFamily="18" charset="0"/>
+              </a:rPr>
+            </a:br>
+            <a:endParaRPr lang="ru-RU" sz="2800" dirty="0">
+              <a:latin typeface="Times New Roman" panose="02020603050405020304" pitchFamily="18" charset="0"/>
+              <a:cs typeface="Times New Roman" panose="02020603050405020304" pitchFamily="18" charset="0"/>
+            </a:endParaRPr>
+          </a:p>
+        </p:txBody>
+      </p:sp>
+      <p:sp>
+        <p:nvSpPr>
+          <p:cNvPr id="5" name="Номер слайда 4">
+            <a:extLst>
+              <a:ext uri="{FF2B5EF4-FFF2-40B4-BE49-F238E27FC236}">
+                <a16:creationId xmlns:a16="http://schemas.microsoft.com/office/drawing/2014/main" id="{9F3495B7-380D-924A-86A4-09BFB46C044B}"/>
+              </a:ext>
+            </a:extLst>
+          </p:cNvPr>
+          <p:cNvSpPr>
+            <a:spLocks noGrp="1"/>
+          </p:cNvSpPr>
+          <p:nvPr>
+            <p:ph type="sldNum" sz="quarter" idx="12"/>
+          </p:nvPr>
+        </p:nvSpPr>
+        <p:spPr>
+          <a:xfrm>
+            <a:off x="5151120" y="4612805"/>
+            <a:ext cx="2743200" cy="365125"/>
+          </a:xfrm>
+        </p:spPr>
+        <p:txBody>
+          <a:bodyPr/>
+          <a:lstStyle/>
+          <a:p>
+            <a:fld id="{6BB697E3-DD58-B344-99E6-BC7A3ED9A2AD}" type="slidenum">
+              <a:rPr lang="ru-RU" smtClean="0"/>
+              <a:t>13</a:t>
+            </a:fld>
+            <a:endParaRPr lang="ru-RU"/>
+          </a:p>
+        </p:txBody>
+      </p:sp>
+      <p:pic>
+        <p:nvPicPr>
+          <p:cNvPr id="6" name="Рисунок 5">
+            <a:extLst>
+              <a:ext uri="{FF2B5EF4-FFF2-40B4-BE49-F238E27FC236}">
+                <a16:creationId xmlns:a16="http://schemas.microsoft.com/office/drawing/2014/main" id="{80D91F3A-5E5C-0B4A-BE7E-6C3D1FEEF654}"/>
+              </a:ext>
+            </a:extLst>
+          </p:cNvPr>
+          <p:cNvPicPr>
+            <a:picLocks noChangeAspect="1"/>
+          </p:cNvPicPr>
+          <p:nvPr/>
+        </p:nvPicPr>
+        <p:blipFill>
+          <a:blip r:embed="rId2">
+            <a:extLst>
+              <a:ext uri="{28A0092B-C50C-407E-A947-70E740481C1C}">
+                <a14:useLocalDpi xmlns:a14="http://schemas.microsoft.com/office/drawing/2010/main" val="0"/>
+              </a:ext>
+            </a:extLst>
+          </a:blip>
+          <a:stretch>
+            <a:fillRect/>
+          </a:stretch>
+        </p:blipFill>
+        <p:spPr>
+          <a:xfrm>
+            <a:off x="838200" y="3139440"/>
+            <a:ext cx="7327900" cy="1422400"/>
+          </a:xfrm>
+          <a:prstGeom prst="rect">
+            <a:avLst/>
+          </a:prstGeom>
+        </p:spPr>
+      </p:pic>
+      <mc:AlternateContent xmlns:mc="http://schemas.openxmlformats.org/markup-compatibility/2006" xmlns:a14="http://schemas.microsoft.com/office/drawing/2010/main">
+        <mc:Choice Requires="a14">
+          <p:sp>
+            <p:nvSpPr>
+              <p:cNvPr id="7" name="TextBox 6">
+                <a:extLst>
+                  <a:ext uri="{FF2B5EF4-FFF2-40B4-BE49-F238E27FC236}">
+                    <a16:creationId xmlns:a16="http://schemas.microsoft.com/office/drawing/2014/main" id="{72645B95-4DEE-DA43-B4A8-52696ABCD5DC}"/>
+                  </a:ext>
+                </a:extLst>
+              </p:cNvPr>
+              <p:cNvSpPr txBox="1"/>
+              <p:nvPr/>
+            </p:nvSpPr>
+            <p:spPr>
+              <a:xfrm>
+                <a:off x="685800" y="5033035"/>
+                <a:ext cx="3017520" cy="673711"/>
+              </a:xfrm>
+              <a:prstGeom prst="rect">
+                <a:avLst/>
+              </a:prstGeom>
+              <a:noFill/>
+            </p:spPr>
+            <p:txBody>
+              <a:bodyPr wrap="square" rtlCol="0">
+                <a:spAutoFit/>
+              </a:bodyPr>
+              <a:lstStyle/>
+              <a:p>
+                <a:pPr/>
+                <a14:m>
+                  <m:oMathPara xmlns:m="http://schemas.openxmlformats.org/officeDocument/2006/math">
+                    <m:oMathParaPr>
+                      <m:jc m:val="centerGroup"/>
+                    </m:oMathParaPr>
+                    <m:oMath xmlns:m="http://schemas.openxmlformats.org/officeDocument/2006/math">
+                      <m:r>
+                        <a:rPr lang="ru-RU" sz="2000" i="1">
+                          <a:latin typeface="Cambria Math" panose="02040503050406030204" pitchFamily="18" charset="0"/>
+                        </a:rPr>
+                        <m:t>𝑃𝑟𝑒𝑐𝑖𝑠𝑖𝑜𝑛</m:t>
+                      </m:r>
+                      <m:r>
+                        <a:rPr lang="ru-RU" sz="2000" i="1">
+                          <a:latin typeface="Cambria Math" panose="02040503050406030204" pitchFamily="18" charset="0"/>
+                        </a:rPr>
+                        <m:t>=</m:t>
+                      </m:r>
+                      <m:f>
+                        <m:fPr>
+                          <m:ctrlPr>
+                            <a:rPr lang="ru-RU" sz="2000" i="1">
+                              <a:latin typeface="Cambria Math" panose="02040503050406030204" pitchFamily="18" charset="0"/>
+                            </a:rPr>
+                          </m:ctrlPr>
+                        </m:fPr>
+                        <m:num>
+                          <m:r>
+                            <a:rPr lang="ru-RU" sz="2000" i="1">
+                              <a:latin typeface="Cambria Math" panose="02040503050406030204" pitchFamily="18" charset="0"/>
+                            </a:rPr>
+                            <m:t>𝑇𝑃</m:t>
+                          </m:r>
+                        </m:num>
+                        <m:den>
+                          <m:r>
+                            <a:rPr lang="ru-RU" sz="2000" i="1">
+                              <a:latin typeface="Cambria Math" panose="02040503050406030204" pitchFamily="18" charset="0"/>
+                            </a:rPr>
+                            <m:t>𝑇𝑃</m:t>
+                          </m:r>
+                          <m:r>
+                            <a:rPr lang="ru-RU" sz="2000" i="1">
+                              <a:latin typeface="Cambria Math" panose="02040503050406030204" pitchFamily="18" charset="0"/>
+                            </a:rPr>
+                            <m:t>+</m:t>
+                          </m:r>
+                          <m:r>
+                            <a:rPr lang="ru-RU" sz="2000" i="1">
+                              <a:latin typeface="Cambria Math" panose="02040503050406030204" pitchFamily="18" charset="0"/>
+                            </a:rPr>
+                            <m:t>𝐹𝑃</m:t>
+                          </m:r>
+                        </m:den>
+                      </m:f>
+                    </m:oMath>
+                  </m:oMathPara>
+                </a14:m>
+                <a:endParaRPr lang="ru-RU" sz="2000" dirty="0"/>
+              </a:p>
+            </p:txBody>
+          </p:sp>
+        </mc:Choice>
+        <mc:Fallback xmlns="">
+          <p:sp>
+            <p:nvSpPr>
+              <p:cNvPr id="7" name="TextBox 6">
+                <a:extLst>
+                  <a:ext uri="{FF2B5EF4-FFF2-40B4-BE49-F238E27FC236}">
+                    <a16:creationId xmlns:a16="http://schemas.microsoft.com/office/drawing/2014/main" id="{72645B95-4DEE-DA43-B4A8-52696ABCD5DC}"/>
+                  </a:ext>
+                </a:extLst>
+              </p:cNvPr>
+              <p:cNvSpPr txBox="1">
+                <a:spLocks noRot="1" noChangeAspect="1" noMove="1" noResize="1" noEditPoints="1" noAdjustHandles="1" noChangeArrowheads="1" noChangeShapeType="1" noTextEdit="1"/>
+              </p:cNvSpPr>
+              <p:nvPr/>
+            </p:nvSpPr>
+            <p:spPr>
+              <a:xfrm>
+                <a:off x="685800" y="5033035"/>
+                <a:ext cx="3017520" cy="673711"/>
+              </a:xfrm>
+              <a:prstGeom prst="rect">
+                <a:avLst/>
+              </a:prstGeom>
+              <a:blipFill>
+                <a:blip r:embed="rId3"/>
+                <a:stretch>
+                  <a:fillRect b="-3774"/>
+                </a:stretch>
+              </a:blipFill>
+            </p:spPr>
+            <p:txBody>
+              <a:bodyPr/>
+              <a:lstStyle/>
+              <a:p>
+                <a:r>
+                  <a:rPr lang="ru-RU">
+                    <a:noFill/>
+                  </a:rPr>
+                  <a:t> </a:t>
+                </a:r>
+              </a:p>
+            </p:txBody>
+          </p:sp>
+        </mc:Fallback>
+      </mc:AlternateContent>
+      <mc:AlternateContent xmlns:mc="http://schemas.openxmlformats.org/markup-compatibility/2006" xmlns:a14="http://schemas.microsoft.com/office/drawing/2010/main">
+        <mc:Choice Requires="a14">
+          <p:sp>
+            <p:nvSpPr>
+              <p:cNvPr id="8" name="TextBox 7">
+                <a:extLst>
+                  <a:ext uri="{FF2B5EF4-FFF2-40B4-BE49-F238E27FC236}">
+                    <a16:creationId xmlns:a16="http://schemas.microsoft.com/office/drawing/2014/main" id="{635ADA2D-F59B-A640-927D-DDDCF1FE98FA}"/>
+                  </a:ext>
+                </a:extLst>
+              </p:cNvPr>
+              <p:cNvSpPr txBox="1"/>
+              <p:nvPr/>
+            </p:nvSpPr>
+            <p:spPr>
+              <a:xfrm>
+                <a:off x="3916680" y="5038585"/>
+                <a:ext cx="2468880" cy="673711"/>
+              </a:xfrm>
+              <a:prstGeom prst="rect">
+                <a:avLst/>
+              </a:prstGeom>
+              <a:noFill/>
+            </p:spPr>
+            <p:txBody>
+              <a:bodyPr wrap="square" rtlCol="0">
+                <a:spAutoFit/>
+              </a:bodyPr>
+              <a:lstStyle/>
+              <a:p>
+                <a:pPr/>
+                <a14:m>
+                  <m:oMathPara xmlns:m="http://schemas.openxmlformats.org/officeDocument/2006/math">
+                    <m:oMathParaPr>
+                      <m:jc m:val="centerGroup"/>
+                    </m:oMathParaPr>
+                    <m:oMath xmlns:m="http://schemas.openxmlformats.org/officeDocument/2006/math">
+                      <m:r>
+                        <a:rPr lang="ru-RU" sz="2000" i="1">
+                          <a:latin typeface="Cambria Math" panose="02040503050406030204" pitchFamily="18" charset="0"/>
+                        </a:rPr>
+                        <m:t>𝑅𝑒𝑐𝑎𝑙𝑙</m:t>
+                      </m:r>
+                      <m:r>
+                        <a:rPr lang="ru-RU" sz="2000" i="1">
+                          <a:latin typeface="Cambria Math" panose="02040503050406030204" pitchFamily="18" charset="0"/>
+                        </a:rPr>
+                        <m:t>=</m:t>
+                      </m:r>
+                      <m:f>
+                        <m:fPr>
+                          <m:ctrlPr>
+                            <a:rPr lang="ru-RU" sz="2000" i="1">
+                              <a:latin typeface="Cambria Math" panose="02040503050406030204" pitchFamily="18" charset="0"/>
+                            </a:rPr>
+                          </m:ctrlPr>
+                        </m:fPr>
+                        <m:num>
+                          <m:r>
+                            <a:rPr lang="ru-RU" sz="2000" i="1">
+                              <a:latin typeface="Cambria Math" panose="02040503050406030204" pitchFamily="18" charset="0"/>
+                            </a:rPr>
+                            <m:t>𝑇𝑃</m:t>
+                          </m:r>
+                        </m:num>
+                        <m:den>
+                          <m:r>
+                            <a:rPr lang="ru-RU" sz="2000" i="1">
+                              <a:latin typeface="Cambria Math" panose="02040503050406030204" pitchFamily="18" charset="0"/>
+                            </a:rPr>
+                            <m:t>𝑇𝑃</m:t>
+                          </m:r>
+                          <m:r>
+                            <a:rPr lang="ru-RU" sz="2000" i="1">
+                              <a:latin typeface="Cambria Math" panose="02040503050406030204" pitchFamily="18" charset="0"/>
+                            </a:rPr>
+                            <m:t>+</m:t>
+                          </m:r>
+                          <m:r>
+                            <a:rPr lang="ru-RU" sz="2000" i="1">
+                              <a:latin typeface="Cambria Math" panose="02040503050406030204" pitchFamily="18" charset="0"/>
+                            </a:rPr>
+                            <m:t>𝐹𝑁</m:t>
+                          </m:r>
+                        </m:den>
+                      </m:f>
+                    </m:oMath>
+                  </m:oMathPara>
+                </a14:m>
+                <a:endParaRPr lang="ru-RU" sz="2000" dirty="0"/>
+              </a:p>
+            </p:txBody>
+          </p:sp>
+        </mc:Choice>
+        <mc:Fallback xmlns="">
+          <p:sp>
+            <p:nvSpPr>
+              <p:cNvPr id="8" name="TextBox 7">
+                <a:extLst>
+                  <a:ext uri="{FF2B5EF4-FFF2-40B4-BE49-F238E27FC236}">
+                    <a16:creationId xmlns:a16="http://schemas.microsoft.com/office/drawing/2014/main" id="{635ADA2D-F59B-A640-927D-DDDCF1FE98FA}"/>
+                  </a:ext>
+                </a:extLst>
+              </p:cNvPr>
+              <p:cNvSpPr txBox="1">
+                <a:spLocks noRot="1" noChangeAspect="1" noMove="1" noResize="1" noEditPoints="1" noAdjustHandles="1" noChangeArrowheads="1" noChangeShapeType="1" noTextEdit="1"/>
+              </p:cNvSpPr>
+              <p:nvPr/>
+            </p:nvSpPr>
+            <p:spPr>
+              <a:xfrm>
+                <a:off x="3916680" y="5038585"/>
+                <a:ext cx="2468880" cy="673711"/>
+              </a:xfrm>
+              <a:prstGeom prst="rect">
+                <a:avLst/>
+              </a:prstGeom>
+              <a:blipFill>
+                <a:blip r:embed="rId4"/>
+                <a:stretch>
+                  <a:fillRect b="-3704"/>
+                </a:stretch>
+              </a:blipFill>
+            </p:spPr>
+            <p:txBody>
+              <a:bodyPr/>
+              <a:lstStyle/>
+              <a:p>
+                <a:r>
+                  <a:rPr lang="ru-RU">
+                    <a:noFill/>
+                  </a:rPr>
+                  <a:t> </a:t>
+                </a:r>
+              </a:p>
+            </p:txBody>
+          </p:sp>
+        </mc:Fallback>
+      </mc:AlternateContent>
+      <mc:AlternateContent xmlns:mc="http://schemas.openxmlformats.org/markup-compatibility/2006" xmlns:a14="http://schemas.microsoft.com/office/drawing/2010/main">
+        <mc:Choice Requires="a14">
+          <p:sp>
+            <p:nvSpPr>
+              <p:cNvPr id="9" name="TextBox 8">
+                <a:extLst>
+                  <a:ext uri="{FF2B5EF4-FFF2-40B4-BE49-F238E27FC236}">
+                    <a16:creationId xmlns:a16="http://schemas.microsoft.com/office/drawing/2014/main" id="{C168057A-606C-4F40-A513-D04D0D8BF483}"/>
+                  </a:ext>
+                </a:extLst>
+              </p:cNvPr>
+              <p:cNvSpPr txBox="1"/>
+              <p:nvPr/>
+            </p:nvSpPr>
+            <p:spPr>
+              <a:xfrm>
+                <a:off x="7223760" y="5038585"/>
+                <a:ext cx="3916680" cy="681853"/>
+              </a:xfrm>
+              <a:prstGeom prst="rect">
+                <a:avLst/>
+              </a:prstGeom>
+              <a:noFill/>
+            </p:spPr>
+            <p:txBody>
+              <a:bodyPr wrap="square" rtlCol="0">
+                <a:spAutoFit/>
+              </a:bodyPr>
+              <a:lstStyle/>
+              <a:p>
+                <a:pPr/>
+                <a14:m>
+                  <m:oMathPara xmlns:m="http://schemas.openxmlformats.org/officeDocument/2006/math">
+                    <m:oMathParaPr>
+                      <m:jc m:val="centerGroup"/>
+                    </m:oMathParaPr>
+                    <m:oMath xmlns:m="http://schemas.openxmlformats.org/officeDocument/2006/math">
+                      <m:r>
+                        <a:rPr lang="ru-RU" sz="2000" i="1">
+                          <a:latin typeface="Cambria Math" panose="02040503050406030204" pitchFamily="18" charset="0"/>
+                        </a:rPr>
+                        <m:t>𝐹</m:t>
+                      </m:r>
+                      <m:r>
+                        <a:rPr lang="ru-RU" sz="2000" i="1">
+                          <a:latin typeface="Cambria Math" panose="02040503050406030204" pitchFamily="18" charset="0"/>
+                        </a:rPr>
+                        <m:t>=2</m:t>
+                      </m:r>
+                      <m:f>
+                        <m:fPr>
+                          <m:ctrlPr>
+                            <a:rPr lang="ru-RU" sz="2000" i="1">
+                              <a:latin typeface="Cambria Math" panose="02040503050406030204" pitchFamily="18" charset="0"/>
+                            </a:rPr>
+                          </m:ctrlPr>
+                        </m:fPr>
+                        <m:num>
+                          <m:r>
+                            <a:rPr lang="ru-RU" sz="2000" i="1">
+                              <a:latin typeface="Cambria Math" panose="02040503050406030204" pitchFamily="18" charset="0"/>
+                            </a:rPr>
+                            <m:t>𝑃𝑟𝑒𝑐𝑖𝑠𝑖𝑜𝑛</m:t>
+                          </m:r>
+                          <m:r>
+                            <a:rPr lang="ru-RU" sz="2000" i="1">
+                              <a:latin typeface="Cambria Math" panose="02040503050406030204" pitchFamily="18" charset="0"/>
+                            </a:rPr>
+                            <m:t>×</m:t>
+                          </m:r>
+                          <m:r>
+                            <a:rPr lang="ru-RU" sz="2000" i="1">
+                              <a:latin typeface="Cambria Math" panose="02040503050406030204" pitchFamily="18" charset="0"/>
+                            </a:rPr>
+                            <m:t>𝑅𝑒𝑐𝑎𝑙𝑙</m:t>
+                          </m:r>
+                        </m:num>
+                        <m:den>
+                          <m:r>
+                            <a:rPr lang="ru-RU" sz="2000" i="1">
+                              <a:latin typeface="Cambria Math" panose="02040503050406030204" pitchFamily="18" charset="0"/>
+                            </a:rPr>
+                            <m:t>𝑃𝑟𝑒𝑐𝑖𝑠𝑖𝑜𝑛</m:t>
+                          </m:r>
+                          <m:r>
+                            <a:rPr lang="ru-RU" sz="2000" i="1">
+                              <a:latin typeface="Cambria Math" panose="02040503050406030204" pitchFamily="18" charset="0"/>
+                            </a:rPr>
+                            <m:t>+</m:t>
+                          </m:r>
+                          <m:r>
+                            <a:rPr lang="ru-RU" sz="2000" i="1">
+                              <a:latin typeface="Cambria Math" panose="02040503050406030204" pitchFamily="18" charset="0"/>
+                            </a:rPr>
+                            <m:t>𝑅𝑒𝑐𝑎𝑙𝑙</m:t>
+                          </m:r>
+                        </m:den>
+                      </m:f>
+                    </m:oMath>
+                  </m:oMathPara>
+                </a14:m>
+                <a:endParaRPr lang="ru-RU" sz="2000" dirty="0"/>
+              </a:p>
+            </p:txBody>
+          </p:sp>
+        </mc:Choice>
+        <mc:Fallback xmlns="">
+          <p:sp>
+            <p:nvSpPr>
+              <p:cNvPr id="9" name="TextBox 8">
+                <a:extLst>
+                  <a:ext uri="{FF2B5EF4-FFF2-40B4-BE49-F238E27FC236}">
+                    <a16:creationId xmlns:a16="http://schemas.microsoft.com/office/drawing/2014/main" id="{C168057A-606C-4F40-A513-D04D0D8BF483}"/>
+                  </a:ext>
+                </a:extLst>
+              </p:cNvPr>
+              <p:cNvSpPr txBox="1">
+                <a:spLocks noRot="1" noChangeAspect="1" noMove="1" noResize="1" noEditPoints="1" noAdjustHandles="1" noChangeArrowheads="1" noChangeShapeType="1" noTextEdit="1"/>
+              </p:cNvSpPr>
+              <p:nvPr/>
+            </p:nvSpPr>
+            <p:spPr>
+              <a:xfrm>
+                <a:off x="7223760" y="5038585"/>
+                <a:ext cx="3916680" cy="681853"/>
+              </a:xfrm>
+              <a:prstGeom prst="rect">
+                <a:avLst/>
+              </a:prstGeom>
+              <a:blipFill>
+                <a:blip r:embed="rId5"/>
+                <a:stretch>
+                  <a:fillRect b="-5556"/>
+                </a:stretch>
+              </a:blipFill>
+            </p:spPr>
+            <p:txBody>
+              <a:bodyPr/>
+              <a:lstStyle/>
+              <a:p>
+                <a:r>
+                  <a:rPr lang="ru-RU">
+                    <a:noFill/>
+                  </a:rPr>
+                  <a:t> </a:t>
+                </a:r>
+              </a:p>
+            </p:txBody>
+          </p:sp>
+        </mc:Fallback>
+      </mc:AlternateContent>
+      <p:sp>
+        <p:nvSpPr>
+          <p:cNvPr id="10" name="Номер слайда 3">
+            <a:extLst>
+              <a:ext uri="{FF2B5EF4-FFF2-40B4-BE49-F238E27FC236}">
+                <a16:creationId xmlns:a16="http://schemas.microsoft.com/office/drawing/2014/main" id="{6A4DE3E8-8B63-0046-94E9-6EFEF8C751A9}"/>
+              </a:ext>
+            </a:extLst>
+          </p:cNvPr>
+          <p:cNvSpPr txBox="1">
+            <a:spLocks/>
+          </p:cNvSpPr>
+          <p:nvPr/>
+        </p:nvSpPr>
+        <p:spPr>
+          <a:xfrm>
+            <a:off x="8610600" y="6356350"/>
+            <a:ext cx="2743200" cy="365125"/>
+          </a:xfrm>
+          <a:prstGeom prst="rect">
+            <a:avLst/>
+          </a:prstGeom>
+        </p:spPr>
+        <p:txBody>
+          <a:bodyPr vert="horz" lIns="91440" tIns="45720" rIns="91440" bIns="45720" rtlCol="0" anchor="ctr"/>
+          <a:lstStyle>
+            <a:defPPr>
+              <a:defRPr lang="ru-RU"/>
+            </a:defPPr>
+            <a:lvl1pPr marL="0" algn="r" defTabSz="914400" rtl="0" eaLnBrk="1" latinLnBrk="0" hangingPunct="1">
+              <a:defRPr sz="1200" kern="1200">
+                <a:solidFill>
+                  <a:schemeClr val="tx1">
+                    <a:tint val="75000"/>
+                  </a:schemeClr>
+                </a:solidFill>
+                <a:latin typeface="+mn-lt"/>
+                <a:ea typeface="+mn-ea"/>
+                <a:cs typeface="+mn-cs"/>
+              </a:defRPr>
+            </a:lvl1pPr>
+            <a:lvl2pPr marL="457200" algn="l" defTabSz="914400" rtl="0" eaLnBrk="1" latinLnBrk="0" hangingPunct="1">
+              <a:defRPr sz="1800" kern="1200">
+                <a:solidFill>
+                  <a:schemeClr val="tx1"/>
+                </a:solidFill>
+                <a:latin typeface="+mn-lt"/>
+                <a:ea typeface="+mn-ea"/>
+                <a:cs typeface="+mn-cs"/>
+              </a:defRPr>
+            </a:lvl2pPr>
+            <a:lvl3pPr marL="914400" algn="l" defTabSz="914400" rtl="0" eaLnBrk="1" latinLnBrk="0" hangingPunct="1">
+              <a:defRPr sz="1800" kern="1200">
+                <a:solidFill>
+                  <a:schemeClr val="tx1"/>
+                </a:solidFill>
+                <a:latin typeface="+mn-lt"/>
+                <a:ea typeface="+mn-ea"/>
+                <a:cs typeface="+mn-cs"/>
+              </a:defRPr>
+            </a:lvl3pPr>
+            <a:lvl4pPr marL="1371600" algn="l" defTabSz="914400" rtl="0" eaLnBrk="1" latinLnBrk="0" hangingPunct="1">
+              <a:defRPr sz="1800" kern="1200">
+                <a:solidFill>
+                  <a:schemeClr val="tx1"/>
+                </a:solidFill>
+                <a:latin typeface="+mn-lt"/>
+                <a:ea typeface="+mn-ea"/>
+                <a:cs typeface="+mn-cs"/>
+              </a:defRPr>
+            </a:lvl4pPr>
+            <a:lvl5pPr marL="1828800" algn="l" defTabSz="914400" rtl="0" eaLnBrk="1" latinLnBrk="0" hangingPunct="1">
+              <a:defRPr sz="1800" kern="1200">
+                <a:solidFill>
+                  <a:schemeClr val="tx1"/>
+                </a:solidFill>
+                <a:latin typeface="+mn-lt"/>
+                <a:ea typeface="+mn-ea"/>
+                <a:cs typeface="+mn-cs"/>
+              </a:defRPr>
+            </a:lvl5pPr>
+            <a:lvl6pPr marL="2286000" algn="l" defTabSz="914400" rtl="0" eaLnBrk="1" latinLnBrk="0" hangingPunct="1">
+              <a:defRPr sz="1800" kern="1200">
+                <a:solidFill>
+                  <a:schemeClr val="tx1"/>
+                </a:solidFill>
+                <a:latin typeface="+mn-lt"/>
+                <a:ea typeface="+mn-ea"/>
+                <a:cs typeface="+mn-cs"/>
+              </a:defRPr>
+            </a:lvl6pPr>
+            <a:lvl7pPr marL="2743200" algn="l" defTabSz="914400" rtl="0" eaLnBrk="1" latinLnBrk="0" hangingPunct="1">
+              <a:defRPr sz="1800" kern="1200">
+                <a:solidFill>
+                  <a:schemeClr val="tx1"/>
+                </a:solidFill>
+                <a:latin typeface="+mn-lt"/>
+                <a:ea typeface="+mn-ea"/>
+                <a:cs typeface="+mn-cs"/>
+              </a:defRPr>
+            </a:lvl7pPr>
+            <a:lvl8pPr marL="3200400" algn="l" defTabSz="914400" rtl="0" eaLnBrk="1" latinLnBrk="0" hangingPunct="1">
+              <a:defRPr sz="1800" kern="1200">
+                <a:solidFill>
+                  <a:schemeClr val="tx1"/>
+                </a:solidFill>
+                <a:latin typeface="+mn-lt"/>
+                <a:ea typeface="+mn-ea"/>
+                <a:cs typeface="+mn-cs"/>
+              </a:defRPr>
+            </a:lvl8pPr>
+            <a:lvl9pPr marL="3657600" algn="l" defTabSz="914400" rtl="0" eaLnBrk="1" latinLnBrk="0" hangingPunct="1">
+              <a:defRPr sz="1800" kern="1200">
+                <a:solidFill>
+                  <a:schemeClr val="tx1"/>
+                </a:solidFill>
+                <a:latin typeface="+mn-lt"/>
+                <a:ea typeface="+mn-ea"/>
+                <a:cs typeface="+mn-cs"/>
+              </a:defRPr>
+            </a:lvl9pPr>
+          </a:lstStyle>
+          <a:p>
+            <a:fld id="{8B784E8A-7D10-4AAF-929C-959B71E0249E}" type="slidenum">
+              <a:rPr lang="ru-RU" sz="2400" smtClean="0">
+                <a:solidFill>
+                  <a:schemeClr val="tx1"/>
+                </a:solidFill>
+                <a:latin typeface="Times New Roman" pitchFamily="18" charset="0"/>
+                <a:cs typeface="Times New Roman" pitchFamily="18" charset="0"/>
+              </a:rPr>
+              <a:pPr/>
+              <a:t>13</a:t>
+            </a:fld>
+            <a:endParaRPr lang="ru-RU" sz="2400" dirty="0">
+              <a:solidFill>
+                <a:schemeClr val="tx1"/>
+              </a:solidFill>
+              <a:latin typeface="Times New Roman" pitchFamily="18" charset="0"/>
+              <a:cs typeface="Times New Roman" pitchFamily="18" charset="0"/>
+            </a:endParaRPr>
+          </a:p>
+        </p:txBody>
+      </p:sp>
+    </p:spTree>
+    <p:extLst>
+      <p:ext uri="{BB962C8B-B14F-4D97-AF65-F5344CB8AC3E}">
+        <p14:creationId xmlns:p14="http://schemas.microsoft.com/office/powerpoint/2010/main" val="3507773334"/>
+      </p:ext>
+    </p:extLst>
+  </p:cSld>
+  <p:clrMapOvr>
+    <a:masterClrMapping/>
+  </p:clrMapOvr>
+</p:sld>
+</file>
+
 <file path=ppt/slides/slide14.xml><?xml version="1.0" encoding="utf-8"?>
 <p:sld xmlns:a="http://schemas.openxmlformats.org/drawingml/2006/main" xmlns:r="http://schemas.openxmlformats.org/officeDocument/2006/relationships" xmlns:p="http://schemas.openxmlformats.org/presentationml/2006/main">
   <p:cSld>
@@ -8003,7 +8003,7 @@
                 <a:latin typeface="Times New Roman" panose="02020603050405020304" pitchFamily="18" charset="0"/>
                 <a:cs typeface="Times New Roman" panose="02020603050405020304" pitchFamily="18" charset="0"/>
               </a:rPr>
-              <a:t>Проанализировать предметную область</a:t>
+              <a:t>Проанализировать предметную область и существующие методы</a:t>
             </a:r>
           </a:p>
           <a:p>
@@ -8188,7 +8188,7 @@
                 <a:latin typeface="Times New Roman" panose="02020603050405020304" pitchFamily="18" charset="0"/>
                 <a:cs typeface="Times New Roman" panose="02020603050405020304" pitchFamily="18" charset="0"/>
               </a:rPr>
-              <a:t> - раздел лингвистики, занимающийся измерением стилевых характеристик</a:t>
+              <a:t> – раздел лингвистики, занимающийся измерением стилевых характеристик</a:t>
             </a:r>
           </a:p>
           <a:p>
@@ -8320,7 +8320,7 @@
                 <a:latin typeface="Times New Roman" panose="02020603050405020304" pitchFamily="18" charset="0"/>
                 <a:cs typeface="Times New Roman" panose="02020603050405020304" pitchFamily="18" charset="0"/>
               </a:rPr>
-              <a:t>Существующие методы определения авторского инварианта</a:t>
+              <a:t>Существующие подходы к анализу текста</a:t>
             </a:r>
           </a:p>
         </p:txBody>
@@ -8371,7 +8371,7 @@
                 <a:latin typeface="Times New Roman" panose="02020603050405020304" pitchFamily="18" charset="0"/>
                 <a:cs typeface="Times New Roman" panose="02020603050405020304" pitchFamily="18" charset="0"/>
               </a:rPr>
-              <a:t>– требует вмешательства эксперта</a:t>
+              <a:t>– устанавливает связи между структурными единицами текста, требует вмешательства эксперта</a:t>
             </a:r>
           </a:p>
           <a:p>
@@ -10880,7 +10880,21 @@
                 <a:latin typeface="Times New Roman" panose="02020603050405020304" pitchFamily="18" charset="0"/>
                 <a:cs typeface="Times New Roman" panose="02020603050405020304" pitchFamily="18" charset="0"/>
               </a:rPr>
-              <a:t>частотность термина:</a:t>
+              <a:t>частотность </a:t>
+            </a:r>
+            <a:r>
+              <a:rPr lang="ru-RU" dirty="0" err="1">
+                <a:latin typeface="Times New Roman" panose="02020603050405020304" pitchFamily="18" charset="0"/>
+                <a:cs typeface="Times New Roman" panose="02020603050405020304" pitchFamily="18" charset="0"/>
+              </a:rPr>
+              <a:t>токена</a:t>
+            </a:r>
+            <a:r>
+              <a:rPr lang="ru-RU" dirty="0">
+                <a:latin typeface="Times New Roman" panose="02020603050405020304" pitchFamily="18" charset="0"/>
+                <a:cs typeface="Times New Roman" panose="02020603050405020304" pitchFamily="18" charset="0"/>
+              </a:rPr>
+              <a:t>:</a:t>
             </a:r>
             <a:endParaRPr lang="en-US" dirty="0">
               <a:latin typeface="Times New Roman" panose="02020603050405020304" pitchFamily="18" charset="0"/>
@@ -10932,7 +10946,21 @@
                 <a:latin typeface="Times New Roman" panose="02020603050405020304" pitchFamily="18" charset="0"/>
                 <a:cs typeface="Times New Roman" panose="02020603050405020304" pitchFamily="18" charset="0"/>
               </a:rPr>
-              <a:t> — инверсия частоты, с которой некоторое слово встречается в документах коллекции </a:t>
+              <a:t> — инверсия частоты, с которой некоторый </a:t>
+            </a:r>
+            <a:r>
+              <a:rPr lang="ru-RU" dirty="0" err="1">
+                <a:latin typeface="Times New Roman" panose="02020603050405020304" pitchFamily="18" charset="0"/>
+                <a:cs typeface="Times New Roman" panose="02020603050405020304" pitchFamily="18" charset="0"/>
+              </a:rPr>
+              <a:t>токен</a:t>
+            </a:r>
+            <a:r>
+              <a:rPr lang="ru-RU" dirty="0">
+                <a:latin typeface="Times New Roman" panose="02020603050405020304" pitchFamily="18" charset="0"/>
+                <a:cs typeface="Times New Roman" panose="02020603050405020304" pitchFamily="18" charset="0"/>
+              </a:rPr>
+              <a:t> встречается в документах коллекции </a:t>
             </a:r>
           </a:p>
         </p:txBody>
@@ -10984,8 +11012,19 @@
                 <a:latin typeface="Times New Roman" panose="02020603050405020304" pitchFamily="18" charset="0"/>
                 <a:cs typeface="Times New Roman" panose="02020603050405020304" pitchFamily="18" charset="0"/>
               </a:rPr>
-              <a:t>статистическая мера, используемая для оценки важности термина</a:t>
-            </a:r>
+              <a:t>статистическая мера, используемая для оценки важности </a:t>
+            </a:r>
+            <a:r>
+              <a:rPr lang="ru-RU" dirty="0" err="1">
+                <a:latin typeface="Times New Roman" panose="02020603050405020304" pitchFamily="18" charset="0"/>
+                <a:cs typeface="Times New Roman" panose="02020603050405020304" pitchFamily="18" charset="0"/>
+              </a:rPr>
+              <a:t>токена</a:t>
+            </a:r>
+            <a:endParaRPr lang="ru-RU" dirty="0">
+              <a:latin typeface="Times New Roman" panose="02020603050405020304" pitchFamily="18" charset="0"/>
+              <a:cs typeface="Times New Roman" panose="02020603050405020304" pitchFamily="18" charset="0"/>
+            </a:endParaRPr>
           </a:p>
         </p:txBody>
       </p:sp>

</xml_diff>